<commit_message>
- Fix inconsistent first slide
</commit_message>
<xml_diff>
--- a/PROJECT/REPORT/GAMA_Presentation.pptx
+++ b/PROJECT/REPORT/GAMA_Presentation.pptx
@@ -226,7 +226,7 @@
           <a:p>
             <a:fld id="{952492A8-22CB-4331-AD3D-3BEC0118166F}" type="datetimeFigureOut">
               <a:rPr lang="en-US" smtClean="0"/>
-              <a:t>1/12/2025</a:t>
+              <a:t>1/13/2025</a:t>
             </a:fld>
             <a:endParaRPr lang="en-US"/>
           </a:p>
@@ -404,7 +404,7 @@
           <a:p>
             <a:fld id="{CFC5E11D-CF65-4591-B848-CC18A35D62A0}" type="datetimeFigureOut">
               <a:rPr lang="en-US" smtClean="0"/>
-              <a:t>1/12/2025</a:t>
+              <a:t>1/13/2025</a:t>
             </a:fld>
             <a:endParaRPr lang="en-US"/>
           </a:p>
@@ -3961,42 +3961,6 @@
               <a:rPr lang="en-US" dirty="0"/>
               <a:t>Modeling and Simulation of Complex Systems</a:t>
             </a:r>
-          </a:p>
-          <a:p>
-            <a:r>
-              <a:rPr lang="en-US" sz="1800" dirty="0"/>
-              <a:t>Lecturer: Prof. Alexis </a:t>
-            </a:r>
-            <a:r>
-              <a:rPr lang="en-US" sz="1800" dirty="0" err="1"/>
-              <a:t>Drogoul</a:t>
-            </a:r>
-            <a:endParaRPr lang="en-US" sz="1800" dirty="0"/>
-          </a:p>
-          <a:p>
-            <a:r>
-              <a:rPr lang="en-US" sz="1800" dirty="0"/>
-              <a:t>Prog. Arnold </a:t>
-            </a:r>
-          </a:p>
-          <a:p>
-            <a:r>
-              <a:rPr lang="en-US" sz="1800" dirty="0"/>
-              <a:t>Prof. </a:t>
-            </a:r>
-            <a:r>
-              <a:rPr lang="en-US" sz="1800" dirty="0" err="1"/>
-              <a:t>Athur</a:t>
-            </a:r>
-            <a:r>
-              <a:rPr lang="en-US" sz="1800" dirty="0"/>
-              <a:t> </a:t>
-            </a:r>
-            <a:r>
-              <a:rPr lang="en-US" sz="1800" dirty="0" err="1"/>
-              <a:t>Bulgière</a:t>
-            </a:r>
-            <a:endParaRPr lang="en-US" sz="1800" dirty="0"/>
           </a:p>
           <a:p>
             <a:endParaRPr lang="en-US" sz="1800" dirty="0"/>

</xml_diff>